<commit_message>
adding sampler linear model
</commit_message>
<xml_diff>
--- a/STT465_13.pptx
+++ b/STT465_13.pptx
@@ -206,7 +206,7 @@
             <a:fld id="{EC2AD4C0-0FC1-44D9-A720-D776D6428221}" type="datetimeFigureOut">
               <a:rPr lang="en-US" smtClean="0"/>
               <a:pPr/>
-              <a:t>11/16/15</a:t>
+              <a:t>11/18/15</a:t>
             </a:fld>
             <a:endParaRPr lang="en-US"/>
           </a:p>
@@ -1315,7 +1315,7 @@
             <a:fld id="{F9C811E6-0209-4075-80E7-F5953C8ECEE3}" type="datetime1">
               <a:rPr lang="en-US" smtClean="0"/>
               <a:pPr/>
-              <a:t>11/16/15</a:t>
+              <a:t>11/18/15</a:t>
             </a:fld>
             <a:endParaRPr lang="en-US"/>
           </a:p>
@@ -1486,7 +1486,7 @@
             <a:fld id="{648E6BB1-E6D9-4EE7-828F-046F7223761D}" type="datetime1">
               <a:rPr lang="en-US" smtClean="0"/>
               <a:pPr/>
-              <a:t>11/16/15</a:t>
+              <a:t>11/18/15</a:t>
             </a:fld>
             <a:endParaRPr lang="en-US"/>
           </a:p>
@@ -1667,7 +1667,7 @@
             <a:fld id="{B4B9C580-A780-4D76-B2D1-C34F1DA97DF0}" type="datetime1">
               <a:rPr lang="en-US" smtClean="0"/>
               <a:pPr/>
-              <a:t>11/16/15</a:t>
+              <a:t>11/18/15</a:t>
             </a:fld>
             <a:endParaRPr lang="en-US"/>
           </a:p>
@@ -1838,7 +1838,7 @@
             <a:fld id="{EB19DDAF-3255-4785-974C-BB4FAF02D67E}" type="datetime1">
               <a:rPr lang="en-US" smtClean="0"/>
               <a:pPr/>
-              <a:t>11/16/15</a:t>
+              <a:t>11/18/15</a:t>
             </a:fld>
             <a:endParaRPr lang="en-US"/>
           </a:p>
@@ -2085,7 +2085,7 @@
             <a:fld id="{C344AF86-11D1-4E84-BA60-17130236FDAA}" type="datetime1">
               <a:rPr lang="en-US" smtClean="0"/>
               <a:pPr/>
-              <a:t>11/16/15</a:t>
+              <a:t>11/18/15</a:t>
             </a:fld>
             <a:endParaRPr lang="en-US"/>
           </a:p>
@@ -2374,7 +2374,7 @@
             <a:fld id="{A8DD670F-7E07-4783-A6F8-B28127B5AF4A}" type="datetime1">
               <a:rPr lang="en-US" smtClean="0"/>
               <a:pPr/>
-              <a:t>11/16/15</a:t>
+              <a:t>11/18/15</a:t>
             </a:fld>
             <a:endParaRPr lang="en-US"/>
           </a:p>
@@ -2797,7 +2797,7 @@
             <a:fld id="{92676DD9-688F-48EE-8233-B3B78BDDA63D}" type="datetime1">
               <a:rPr lang="en-US" smtClean="0"/>
               <a:pPr/>
-              <a:t>11/16/15</a:t>
+              <a:t>11/18/15</a:t>
             </a:fld>
             <a:endParaRPr lang="en-US"/>
           </a:p>
@@ -2916,7 +2916,7 @@
             <a:fld id="{F6CC4A83-AE34-48B8-B90E-70388FDBF0F7}" type="datetime1">
               <a:rPr lang="en-US" smtClean="0"/>
               <a:pPr/>
-              <a:t>11/16/15</a:t>
+              <a:t>11/18/15</a:t>
             </a:fld>
             <a:endParaRPr lang="en-US"/>
           </a:p>
@@ -3012,7 +3012,7 @@
             <a:fld id="{510CA3E2-9601-488E-B92B-23013819BD02}" type="datetime1">
               <a:rPr lang="en-US" smtClean="0"/>
               <a:pPr/>
-              <a:t>11/16/15</a:t>
+              <a:t>11/18/15</a:t>
             </a:fld>
             <a:endParaRPr lang="en-US"/>
           </a:p>
@@ -3290,7 +3290,7 @@
             <a:fld id="{331F1CBD-358A-4E18-86FD-C337233E15F0}" type="datetime1">
               <a:rPr lang="en-US" smtClean="0"/>
               <a:pPr/>
-              <a:t>11/16/15</a:t>
+              <a:t>11/18/15</a:t>
             </a:fld>
             <a:endParaRPr lang="en-US"/>
           </a:p>
@@ -3544,7 +3544,7 @@
             <a:fld id="{3CB4F0D5-901F-4458-A8F8-F062616694B4}" type="datetime1">
               <a:rPr lang="en-US" smtClean="0"/>
               <a:pPr/>
-              <a:t>11/16/15</a:t>
+              <a:t>11/18/15</a:t>
             </a:fld>
             <a:endParaRPr lang="en-US"/>
           </a:p>
@@ -3758,7 +3758,7 @@
             <a:fld id="{F77D84EF-BDBF-448B-906E-D51D4CAF22DC}" type="datetime1">
               <a:rPr lang="en-US" smtClean="0"/>
               <a:pPr/>
-              <a:t>11/16/15</a:t>
+              <a:t>11/18/15</a:t>
             </a:fld>
             <a:endParaRPr lang="en-US"/>
           </a:p>
@@ -4824,7 +4824,7 @@
           <a:graphicData uri="http://schemas.openxmlformats.org/presentationml/2006/ole">
             <mc:AlternateContent xmlns:mc="http://schemas.openxmlformats.org/markup-compatibility/2006">
               <mc:Choice xmlns:v="urn:schemas-microsoft-com:vml" Requires="v">
-                <p:oleObj spid="_x0000_s1151" name="Equation" r:id="rId4" imgW="1092200" imgH="330200" progId="Equation.3">
+                <p:oleObj spid="_x0000_s1160" name="Equation" r:id="rId4" imgW="1092200" imgH="330200" progId="Equation.3">
                   <p:embed/>
                 </p:oleObj>
               </mc:Choice>
@@ -4881,7 +4881,7 @@
           <a:graphicData uri="http://schemas.openxmlformats.org/presentationml/2006/ole">
             <mc:AlternateContent xmlns:mc="http://schemas.openxmlformats.org/markup-compatibility/2006">
               <mc:Choice xmlns:v="urn:schemas-microsoft-com:vml" Requires="v">
-                <p:oleObj spid="_x0000_s1152" name="Equation" r:id="rId6" imgW="673100" imgH="203200" progId="Equation.3">
+                <p:oleObj spid="_x0000_s1161" name="Equation" r:id="rId6" imgW="673100" imgH="203200" progId="Equation.3">
                   <p:embed/>
                 </p:oleObj>
               </mc:Choice>
@@ -4938,7 +4938,7 @@
           <a:graphicData uri="http://schemas.openxmlformats.org/presentationml/2006/ole">
             <mc:AlternateContent xmlns:mc="http://schemas.openxmlformats.org/markup-compatibility/2006">
               <mc:Choice xmlns:v="urn:schemas-microsoft-com:vml" Requires="v">
-                <p:oleObj spid="_x0000_s1153" name="Equation" r:id="rId8" imgW="1054100" imgH="342900" progId="Equation.3">
+                <p:oleObj spid="_x0000_s1162" name="Equation" r:id="rId8" imgW="1054100" imgH="342900" progId="Equation.3">
                   <p:embed/>
                 </p:oleObj>
               </mc:Choice>
@@ -4995,7 +4995,7 @@
           <a:graphicData uri="http://schemas.openxmlformats.org/presentationml/2006/ole">
             <mc:AlternateContent xmlns:mc="http://schemas.openxmlformats.org/markup-compatibility/2006">
               <mc:Choice xmlns:v="urn:schemas-microsoft-com:vml" Requires="v">
-                <p:oleObj spid="_x0000_s1154" name="Equation" r:id="rId10" imgW="4775200" imgH="1104900" progId="Equation.3">
+                <p:oleObj spid="_x0000_s1163" name="Equation" r:id="rId10" imgW="4775200" imgH="1104900" progId="Equation.3">
                   <p:embed/>
                 </p:oleObj>
               </mc:Choice>
@@ -5097,17 +5097,7 @@
                   </a:schemeClr>
                 </a:solidFill>
               </a:rPr>
-              <a:t>Prior </a:t>
-            </a:r>
-            <a:r>
-              <a:rPr lang="en-US" sz="3200" dirty="0" smtClean="0">
-                <a:solidFill>
-                  <a:schemeClr val="accent2">
-                    <a:lumMod val="75000"/>
-                  </a:schemeClr>
-                </a:solidFill>
-              </a:rPr>
-              <a:t>Distribution</a:t>
+              <a:t>Prior Distribution</a:t>
             </a:r>
             <a:endParaRPr lang="en-US" sz="3200" dirty="0">
               <a:solidFill>
@@ -5411,7 +5401,7 @@
           <a:graphicData uri="http://schemas.openxmlformats.org/presentationml/2006/ole">
             <mc:AlternateContent xmlns:mc="http://schemas.openxmlformats.org/markup-compatibility/2006">
               <mc:Choice xmlns:v="urn:schemas-microsoft-com:vml" Requires="v">
-                <p:oleObj spid="_x0000_s28728" name="Equation" r:id="rId4" imgW="1130300" imgH="508000" progId="Equation.3">
+                <p:oleObj spid="_x0000_s28735" name="Equation" r:id="rId4" imgW="1130300" imgH="508000" progId="Equation.3">
                   <p:embed/>
                 </p:oleObj>
               </mc:Choice>
@@ -5468,7 +5458,7 @@
           <a:graphicData uri="http://schemas.openxmlformats.org/presentationml/2006/ole">
             <mc:AlternateContent xmlns:mc="http://schemas.openxmlformats.org/markup-compatibility/2006">
               <mc:Choice xmlns:v="urn:schemas-microsoft-com:vml" Requires="v">
-                <p:oleObj spid="_x0000_s28729" name="Equation" r:id="rId6" imgW="1168400" imgH="431800" progId="Equation.3">
+                <p:oleObj spid="_x0000_s28736" name="Equation" r:id="rId6" imgW="1168400" imgH="431800" progId="Equation.3">
                   <p:embed/>
                 </p:oleObj>
               </mc:Choice>
@@ -5525,7 +5515,7 @@
           <a:graphicData uri="http://schemas.openxmlformats.org/presentationml/2006/ole">
             <mc:AlternateContent xmlns:mc="http://schemas.openxmlformats.org/markup-compatibility/2006">
               <mc:Choice xmlns:v="urn:schemas-microsoft-com:vml" Requires="v">
-                <p:oleObj spid="_x0000_s28730" name="Equation" r:id="rId8" imgW="1803400" imgH="203200" progId="Equation.3">
+                <p:oleObj spid="_x0000_s28737" name="Equation" r:id="rId8" imgW="1803400" imgH="203200" progId="Equation.3">
                   <p:embed/>
                 </p:oleObj>
               </mc:Choice>
@@ -5909,7 +5899,7 @@
           <a:graphicData uri="http://schemas.openxmlformats.org/presentationml/2006/ole">
             <mc:AlternateContent xmlns:mc="http://schemas.openxmlformats.org/markup-compatibility/2006">
               <mc:Choice xmlns:v="urn:schemas-microsoft-com:vml" Requires="v">
-                <p:oleObj spid="_x0000_s41995" name="Equation" r:id="rId4" imgW="3517900" imgH="622300" progId="Equation.3">
+                <p:oleObj spid="_x0000_s42000" name="Equation" r:id="rId4" imgW="3517900" imgH="622300" progId="Equation.3">
                   <p:embed/>
                 </p:oleObj>
               </mc:Choice>
@@ -5966,7 +5956,7 @@
           <a:graphicData uri="http://schemas.openxmlformats.org/presentationml/2006/ole">
             <mc:AlternateContent xmlns:mc="http://schemas.openxmlformats.org/markup-compatibility/2006">
               <mc:Choice xmlns:v="urn:schemas-microsoft-com:vml" Requires="v">
-                <p:oleObj spid="_x0000_s41996" name="Equation" r:id="rId6" imgW="952500" imgH="292100" progId="Equation.3">
+                <p:oleObj spid="_x0000_s42001" name="Equation" r:id="rId6" imgW="952500" imgH="292100" progId="Equation.3">
                   <p:embed/>
                 </p:oleObj>
               </mc:Choice>
@@ -6351,7 +6341,7 @@
           <a:graphicData uri="http://schemas.openxmlformats.org/presentationml/2006/ole">
             <mc:AlternateContent xmlns:mc="http://schemas.openxmlformats.org/markup-compatibility/2006">
               <mc:Choice xmlns:v="urn:schemas-microsoft-com:vml" Requires="v">
-                <p:oleObj spid="_x0000_s30809" name="Equation" r:id="rId4" imgW="5105400" imgH="1003300" progId="Equation.3">
+                <p:oleObj spid="_x0000_s30812" name="Equation" r:id="rId4" imgW="5105400" imgH="1003300" progId="Equation.3">
                   <p:embed/>
                 </p:oleObj>
               </mc:Choice>
@@ -6751,25 +6741,25 @@
           <p:nvPr>
             <p:extLst>
               <p:ext uri="{D42A27DB-BD31-4B8C-83A1-F6EECF244321}">
-                <p14:modId xmlns:p14="http://schemas.microsoft.com/office/powerpoint/2010/main" val="1008252363"/>
+                <p14:modId xmlns:p14="http://schemas.microsoft.com/office/powerpoint/2010/main" val="4193790359"/>
               </p:ext>
             </p:extLst>
           </p:nvPr>
         </p:nvGraphicFramePr>
         <p:xfrm>
-          <a:off x="2514600" y="4495800"/>
-          <a:ext cx="2973387" cy="1582738"/>
+          <a:off x="2514600" y="4483100"/>
+          <a:ext cx="2973388" cy="1609725"/>
         </p:xfrm>
         <a:graphic>
           <a:graphicData uri="http://schemas.openxmlformats.org/presentationml/2006/ole">
             <mc:AlternateContent xmlns:mc="http://schemas.openxmlformats.org/markup-compatibility/2006">
               <mc:Choice xmlns:v="urn:schemas-microsoft-com:vml" Requires="v">
-                <p:oleObj spid="_x0000_s43023" name="Equation" r:id="rId4" imgW="1384300" imgH="736600" progId="Equation.3">
+                <p:oleObj spid="_x0000_s43030" name="Equation" r:id="rId4" imgW="1384300" imgH="749300" progId="Equation.3">
                   <p:embed/>
                 </p:oleObj>
               </mc:Choice>
               <mc:Fallback>
-                <p:oleObj name="Equation" r:id="rId4" imgW="1384300" imgH="736600" progId="Equation.3">
+                <p:oleObj name="Equation" r:id="rId4" imgW="1384300" imgH="749300" progId="Equation.3">
                   <p:embed/>
                   <p:pic>
                     <p:nvPicPr>
@@ -6785,8 +6775,8 @@
                     </p:blipFill>
                     <p:spPr>
                       <a:xfrm>
-                        <a:off x="2514600" y="4495800"/>
-                        <a:ext cx="2973387" cy="1582738"/>
+                        <a:off x="2514600" y="4483100"/>
+                        <a:ext cx="2973388" cy="1609725"/>
                       </a:xfrm>
                       <a:prstGeom prst="rect">
                         <a:avLst/>
@@ -6808,25 +6798,25 @@
           <p:nvPr>
             <p:extLst>
               <p:ext uri="{D42A27DB-BD31-4B8C-83A1-F6EECF244321}">
-                <p14:modId xmlns:p14="http://schemas.microsoft.com/office/powerpoint/2010/main" val="2901761616"/>
+                <p14:modId xmlns:p14="http://schemas.microsoft.com/office/powerpoint/2010/main" val="2665850036"/>
               </p:ext>
             </p:extLst>
           </p:nvPr>
         </p:nvGraphicFramePr>
         <p:xfrm>
-          <a:off x="990600" y="1295400"/>
-          <a:ext cx="6584950" cy="1400175"/>
+          <a:off x="314325" y="990600"/>
+          <a:ext cx="8142288" cy="1879600"/>
         </p:xfrm>
         <a:graphic>
           <a:graphicData uri="http://schemas.openxmlformats.org/presentationml/2006/ole">
             <mc:AlternateContent xmlns:mc="http://schemas.openxmlformats.org/markup-compatibility/2006">
               <mc:Choice xmlns:v="urn:schemas-microsoft-com:vml" Requires="v">
-                <p:oleObj spid="_x0000_s43024" name="Equation" r:id="rId6" imgW="3644900" imgH="774700" progId="Equation.3">
+                <p:oleObj spid="_x0000_s43031" name="Equation" r:id="rId6" imgW="4787900" imgH="1104900" progId="Equation.3">
                   <p:embed/>
                 </p:oleObj>
               </mc:Choice>
               <mc:Fallback>
-                <p:oleObj name="Equation" r:id="rId6" imgW="3644900" imgH="774700" progId="Equation.3">
+                <p:oleObj name="Equation" r:id="rId6" imgW="4787900" imgH="1104900" progId="Equation.3">
                   <p:embed/>
                   <p:pic>
                     <p:nvPicPr>
@@ -6842,8 +6832,8 @@
                     </p:blipFill>
                     <p:spPr>
                       <a:xfrm>
-                        <a:off x="990600" y="1295400"/>
-                        <a:ext cx="6584950" cy="1400175"/>
+                        <a:off x="314325" y="990600"/>
+                        <a:ext cx="8142288" cy="1879600"/>
                       </a:xfrm>
                       <a:prstGeom prst="rect">
                         <a:avLst/>
@@ -6878,7 +6868,7 @@
           <a:graphicData uri="http://schemas.openxmlformats.org/presentationml/2006/ole">
             <mc:AlternateContent xmlns:mc="http://schemas.openxmlformats.org/markup-compatibility/2006">
               <mc:Choice xmlns:v="urn:schemas-microsoft-com:vml" Requires="v">
-                <p:oleObj spid="_x0000_s43025" name="Equation" r:id="rId8" imgW="2133600" imgH="292100" progId="Equation.3">
+                <p:oleObj spid="_x0000_s43032" name="Equation" r:id="rId8" imgW="2133600" imgH="292100" progId="Equation.3">
                   <p:embed/>
                 </p:oleObj>
               </mc:Choice>
@@ -7263,7 +7253,7 @@
           <a:graphicData uri="http://schemas.openxmlformats.org/presentationml/2006/ole">
             <mc:AlternateContent xmlns:mc="http://schemas.openxmlformats.org/markup-compatibility/2006">
               <mc:Choice xmlns:v="urn:schemas-microsoft-com:vml" Requires="v">
-                <p:oleObj spid="_x0000_s44035" name="Equation" r:id="rId4" imgW="3390900" imgH="1549400" progId="Equation.3">
+                <p:oleObj spid="_x0000_s44038" name="Equation" r:id="rId4" imgW="3390900" imgH="1549400" progId="Equation.3">
                   <p:embed/>
                 </p:oleObj>
               </mc:Choice>
@@ -7662,7 +7652,7 @@
           <a:graphicData uri="http://schemas.openxmlformats.org/presentationml/2006/ole">
             <mc:AlternateContent xmlns:mc="http://schemas.openxmlformats.org/markup-compatibility/2006">
               <mc:Choice xmlns:v="urn:schemas-microsoft-com:vml" Requires="v">
-                <p:oleObj spid="_x0000_s39953" name="Equation" r:id="rId4" imgW="2933700" imgH="304800" progId="Equation.3">
+                <p:oleObj spid="_x0000_s39958" name="Equation" r:id="rId4" imgW="2933700" imgH="304800" progId="Equation.3">
                   <p:embed/>
                 </p:oleObj>
               </mc:Choice>
@@ -7719,7 +7709,7 @@
           <a:graphicData uri="http://schemas.openxmlformats.org/presentationml/2006/ole">
             <mc:AlternateContent xmlns:mc="http://schemas.openxmlformats.org/markup-compatibility/2006">
               <mc:Choice xmlns:v="urn:schemas-microsoft-com:vml" Requires="v">
-                <p:oleObj spid="_x0000_s39954" name="Equation" r:id="rId6" imgW="2882900" imgH="393700" progId="Equation.3">
+                <p:oleObj spid="_x0000_s39959" name="Equation" r:id="rId6" imgW="2882900" imgH="393700" progId="Equation.3">
                   <p:embed/>
                 </p:oleObj>
               </mc:Choice>

</xml_diff>